<commit_message>
update with all SWMM/PySWMM code tests
</commit_message>
<xml_diff>
--- a/node_link_treatment_flowchart.pptx
+++ b/node_link_treatment_flowchart.pptx
@@ -197,7 +197,7 @@
           <a:p>
             <a:fld id="{0AD2591E-F2A0-47FD-A765-3FC5BC91C016}" type="datetimeFigureOut">
               <a:rPr lang="en-US" smtClean="0"/>
-              <a:t>3/25/20</a:t>
+              <a:t>4/6/20</a:t>
             </a:fld>
             <a:endParaRPr lang="en-US"/>
           </a:p>
@@ -684,7 +684,7 @@
           <a:p>
             <a:fld id="{EB4D2A64-363E-4191-8CFE-FAEF2F3330D9}" type="datetimeFigureOut">
               <a:rPr lang="en-US" smtClean="0"/>
-              <a:t>3/25/20</a:t>
+              <a:t>4/6/20</a:t>
             </a:fld>
             <a:endParaRPr lang="en-US"/>
           </a:p>
@@ -854,7 +854,7 @@
           <a:p>
             <a:fld id="{EB4D2A64-363E-4191-8CFE-FAEF2F3330D9}" type="datetimeFigureOut">
               <a:rPr lang="en-US" smtClean="0"/>
-              <a:t>3/25/20</a:t>
+              <a:t>4/6/20</a:t>
             </a:fld>
             <a:endParaRPr lang="en-US"/>
           </a:p>
@@ -1034,7 +1034,7 @@
           <a:p>
             <a:fld id="{EB4D2A64-363E-4191-8CFE-FAEF2F3330D9}" type="datetimeFigureOut">
               <a:rPr lang="en-US" smtClean="0"/>
-              <a:t>3/25/20</a:t>
+              <a:t>4/6/20</a:t>
             </a:fld>
             <a:endParaRPr lang="en-US"/>
           </a:p>
@@ -1204,7 +1204,7 @@
           <a:p>
             <a:fld id="{EB4D2A64-363E-4191-8CFE-FAEF2F3330D9}" type="datetimeFigureOut">
               <a:rPr lang="en-US" smtClean="0"/>
-              <a:t>3/25/20</a:t>
+              <a:t>4/6/20</a:t>
             </a:fld>
             <a:endParaRPr lang="en-US"/>
           </a:p>
@@ -1448,7 +1448,7 @@
           <a:p>
             <a:fld id="{EB4D2A64-363E-4191-8CFE-FAEF2F3330D9}" type="datetimeFigureOut">
               <a:rPr lang="en-US" smtClean="0"/>
-              <a:t>3/25/20</a:t>
+              <a:t>4/6/20</a:t>
             </a:fld>
             <a:endParaRPr lang="en-US"/>
           </a:p>
@@ -1680,7 +1680,7 @@
           <a:p>
             <a:fld id="{EB4D2A64-363E-4191-8CFE-FAEF2F3330D9}" type="datetimeFigureOut">
               <a:rPr lang="en-US" smtClean="0"/>
-              <a:t>3/25/20</a:t>
+              <a:t>4/6/20</a:t>
             </a:fld>
             <a:endParaRPr lang="en-US"/>
           </a:p>
@@ -2047,7 +2047,7 @@
           <a:p>
             <a:fld id="{EB4D2A64-363E-4191-8CFE-FAEF2F3330D9}" type="datetimeFigureOut">
               <a:rPr lang="en-US" smtClean="0"/>
-              <a:t>3/25/20</a:t>
+              <a:t>4/6/20</a:t>
             </a:fld>
             <a:endParaRPr lang="en-US"/>
           </a:p>
@@ -2165,7 +2165,7 @@
           <a:p>
             <a:fld id="{EB4D2A64-363E-4191-8CFE-FAEF2F3330D9}" type="datetimeFigureOut">
               <a:rPr lang="en-US" smtClean="0"/>
-              <a:t>3/25/20</a:t>
+              <a:t>4/6/20</a:t>
             </a:fld>
             <a:endParaRPr lang="en-US"/>
           </a:p>
@@ -2260,7 +2260,7 @@
           <a:p>
             <a:fld id="{EB4D2A64-363E-4191-8CFE-FAEF2F3330D9}" type="datetimeFigureOut">
               <a:rPr lang="en-US" smtClean="0"/>
-              <a:t>3/25/20</a:t>
+              <a:t>4/6/20</a:t>
             </a:fld>
             <a:endParaRPr lang="en-US"/>
           </a:p>
@@ -2537,7 +2537,7 @@
           <a:p>
             <a:fld id="{EB4D2A64-363E-4191-8CFE-FAEF2F3330D9}" type="datetimeFigureOut">
               <a:rPr lang="en-US" smtClean="0"/>
-              <a:t>3/25/20</a:t>
+              <a:t>4/6/20</a:t>
             </a:fld>
             <a:endParaRPr lang="en-US"/>
           </a:p>
@@ -2794,7 +2794,7 @@
           <a:p>
             <a:fld id="{EB4D2A64-363E-4191-8CFE-FAEF2F3330D9}" type="datetimeFigureOut">
               <a:rPr lang="en-US" smtClean="0"/>
-              <a:t>3/25/20</a:t>
+              <a:t>4/6/20</a:t>
             </a:fld>
             <a:endParaRPr lang="en-US"/>
           </a:p>
@@ -3007,7 +3007,7 @@
           <a:p>
             <a:fld id="{EB4D2A64-363E-4191-8CFE-FAEF2F3330D9}" type="datetimeFigureOut">
               <a:rPr lang="en-US" smtClean="0"/>
-              <a:t>3/25/20</a:t>
+              <a:t>4/6/20</a:t>
             </a:fld>
             <a:endParaRPr lang="en-US"/>
           </a:p>

</xml_diff>